<commit_message>
Add response to reviewers and edit manuscript slightly
</commit_message>
<xml_diff>
--- a/manuscript/mechanistic_model.pptx
+++ b/manuscript/mechanistic_model.pptx
@@ -107,6 +107,11 @@
       </a:defRPr>
     </a:lvl9pPr>
   </p:defaultTextStyle>
+  <p:extLst>
+    <p:ext uri="{EFAFB233-063F-42B5-8137-9DF3F51BA10A}">
+      <p15:sldGuideLst xmlns:p15="http://schemas.microsoft.com/office/powerpoint/2012/main"/>
+    </p:ext>
+  </p:extLst>
 </p:presentation>
 </file>
 
@@ -192,7 +197,7 @@
           <a:p>
             <a:fld id="{5212AEE6-6BAB-BB4B-9F2C-9A584A0FAA47}" type="datetimeFigureOut">
               <a:rPr lang="en-US" smtClean="0"/>
-              <a:t>11/6/19</a:t>
+              <a:t>11/26/19</a:t>
             </a:fld>
             <a:endParaRPr lang="en-US"/>
           </a:p>
@@ -747,7 +752,7 @@
           <a:p>
             <a:fld id="{F60893F3-E6EE-4D40-9DE2-B9EB00003962}" type="datetimeFigureOut">
               <a:rPr lang="en-US" smtClean="0"/>
-              <a:t>11/6/19</a:t>
+              <a:t>11/26/19</a:t>
             </a:fld>
             <a:endParaRPr lang="en-US"/>
           </a:p>
@@ -945,7 +950,7 @@
           <a:p>
             <a:fld id="{F60893F3-E6EE-4D40-9DE2-B9EB00003962}" type="datetimeFigureOut">
               <a:rPr lang="en-US" smtClean="0"/>
-              <a:t>11/6/19</a:t>
+              <a:t>11/26/19</a:t>
             </a:fld>
             <a:endParaRPr lang="en-US"/>
           </a:p>
@@ -1153,7 +1158,7 @@
           <a:p>
             <a:fld id="{F60893F3-E6EE-4D40-9DE2-B9EB00003962}" type="datetimeFigureOut">
               <a:rPr lang="en-US" smtClean="0"/>
-              <a:t>11/6/19</a:t>
+              <a:t>11/26/19</a:t>
             </a:fld>
             <a:endParaRPr lang="en-US"/>
           </a:p>
@@ -1351,7 +1356,7 @@
           <a:p>
             <a:fld id="{F60893F3-E6EE-4D40-9DE2-B9EB00003962}" type="datetimeFigureOut">
               <a:rPr lang="en-US" smtClean="0"/>
-              <a:t>11/6/19</a:t>
+              <a:t>11/26/19</a:t>
             </a:fld>
             <a:endParaRPr lang="en-US"/>
           </a:p>
@@ -1626,7 +1631,7 @@
           <a:p>
             <a:fld id="{F60893F3-E6EE-4D40-9DE2-B9EB00003962}" type="datetimeFigureOut">
               <a:rPr lang="en-US" smtClean="0"/>
-              <a:t>11/6/19</a:t>
+              <a:t>11/26/19</a:t>
             </a:fld>
             <a:endParaRPr lang="en-US"/>
           </a:p>
@@ -1891,7 +1896,7 @@
           <a:p>
             <a:fld id="{F60893F3-E6EE-4D40-9DE2-B9EB00003962}" type="datetimeFigureOut">
               <a:rPr lang="en-US" smtClean="0"/>
-              <a:t>11/6/19</a:t>
+              <a:t>11/26/19</a:t>
             </a:fld>
             <a:endParaRPr lang="en-US"/>
           </a:p>
@@ -2303,7 +2308,7 @@
           <a:p>
             <a:fld id="{F60893F3-E6EE-4D40-9DE2-B9EB00003962}" type="datetimeFigureOut">
               <a:rPr lang="en-US" smtClean="0"/>
-              <a:t>11/6/19</a:t>
+              <a:t>11/26/19</a:t>
             </a:fld>
             <a:endParaRPr lang="en-US"/>
           </a:p>
@@ -2444,7 +2449,7 @@
           <a:p>
             <a:fld id="{F60893F3-E6EE-4D40-9DE2-B9EB00003962}" type="datetimeFigureOut">
               <a:rPr lang="en-US" smtClean="0"/>
-              <a:t>11/6/19</a:t>
+              <a:t>11/26/19</a:t>
             </a:fld>
             <a:endParaRPr lang="en-US"/>
           </a:p>
@@ -2557,7 +2562,7 @@
           <a:p>
             <a:fld id="{F60893F3-E6EE-4D40-9DE2-B9EB00003962}" type="datetimeFigureOut">
               <a:rPr lang="en-US" smtClean="0"/>
-              <a:t>11/6/19</a:t>
+              <a:t>11/26/19</a:t>
             </a:fld>
             <a:endParaRPr lang="en-US"/>
           </a:p>
@@ -2868,7 +2873,7 @@
           <a:p>
             <a:fld id="{F60893F3-E6EE-4D40-9DE2-B9EB00003962}" type="datetimeFigureOut">
               <a:rPr lang="en-US" smtClean="0"/>
-              <a:t>11/6/19</a:t>
+              <a:t>11/26/19</a:t>
             </a:fld>
             <a:endParaRPr lang="en-US"/>
           </a:p>
@@ -3156,7 +3161,7 @@
           <a:p>
             <a:fld id="{F60893F3-E6EE-4D40-9DE2-B9EB00003962}" type="datetimeFigureOut">
               <a:rPr lang="en-US" smtClean="0"/>
-              <a:t>11/6/19</a:t>
+              <a:t>11/26/19</a:t>
             </a:fld>
             <a:endParaRPr lang="en-US"/>
           </a:p>
@@ -3397,7 +3402,7 @@
           <a:p>
             <a:fld id="{F60893F3-E6EE-4D40-9DE2-B9EB00003962}" type="datetimeFigureOut">
               <a:rPr lang="en-US" smtClean="0"/>
-              <a:t>11/6/19</a:t>
+              <a:t>11/26/19</a:t>
             </a:fld>
             <a:endParaRPr lang="en-US"/>
           </a:p>
@@ -4018,7 +4023,7 @@
                       <m:f>
                         <m:fPr>
                           <m:ctrlPr>
-                            <a:rPr lang="en-US" i="1">
+                            <a:rPr lang="en-US" i="1" smtClean="0">
                               <a:latin typeface="Cambria Math" panose="02040503050406030204" pitchFamily="18" charset="0"/>
                             </a:rPr>
                           </m:ctrlPr>
@@ -4178,10 +4183,10 @@
                             </m:e>
                           </m:d>
                           <m:r>
-                            <a:rPr lang="en-US" i="1">
+                            <a:rPr lang="en-US" b="0" i="1" smtClean="0">
                               <a:latin typeface="Cambria Math" panose="02040503050406030204" pitchFamily="18" charset="0"/>
                             </a:rPr>
-                            <m:t>𝑓</m:t>
+                            <m:t>h</m:t>
                           </m:r>
                           <m:d>
                             <m:dPr>
@@ -4365,8 +4370,8 @@
           </a:p>
         </p:txBody>
       </p:sp>
-      <mc:AlternateContent xmlns:mc="http://schemas.openxmlformats.org/markup-compatibility/2006">
-        <mc:Choice xmlns:a14="http://schemas.microsoft.com/office/drawing/2010/main" Requires="a14">
+      <mc:AlternateContent xmlns:mc="http://schemas.openxmlformats.org/markup-compatibility/2006" xmlns:a14="http://schemas.microsoft.com/office/drawing/2010/main">
+        <mc:Choice Requires="a14">
           <p:sp>
             <p:nvSpPr>
               <p:cNvPr id="23" name="Rectangle 22">
@@ -4578,7 +4583,7 @@
             </p:txBody>
           </p:sp>
         </mc:Choice>
-        <mc:Fallback>
+        <mc:Fallback xmlns="">
           <p:sp>
             <p:nvSpPr>
               <p:cNvPr id="23" name="Rectangle 22">
@@ -4660,10 +4665,10 @@
                     </m:oMathParaPr>
                     <m:oMath xmlns:m="http://schemas.openxmlformats.org/officeDocument/2006/math">
                       <m:r>
-                        <a:rPr lang="en-US" i="1">
+                        <a:rPr lang="en-US" b="0" i="1" smtClean="0">
                           <a:latin typeface="Cambria Math" panose="02040503050406030204" pitchFamily="18" charset="0"/>
                         </a:rPr>
-                        <m:t>𝑓</m:t>
+                        <m:t>h</m:t>
                       </m:r>
                       <m:d>
                         <m:dPr>
@@ -4982,10 +4987,10 @@
                         </m:e>
                       </m:d>
                       <m:r>
-                        <a:rPr lang="en-US" i="1">
+                        <a:rPr lang="en-US" b="0" i="1" smtClean="0">
                           <a:latin typeface="Cambria Math" panose="02040503050406030204" pitchFamily="18" charset="0"/>
                         </a:rPr>
-                        <m:t>𝑓</m:t>
+                        <m:t>h</m:t>
                       </m:r>
                       <m:d>
                         <m:dPr>
@@ -5763,8 +5768,8 @@
           </p:txBody>
         </p:sp>
       </p:grpSp>
-      <mc:AlternateContent xmlns:mc="http://schemas.openxmlformats.org/markup-compatibility/2006">
-        <mc:Choice xmlns:a14="http://schemas.microsoft.com/office/drawing/2010/main" Requires="a14">
+      <mc:AlternateContent xmlns:mc="http://schemas.openxmlformats.org/markup-compatibility/2006" xmlns:a14="http://schemas.microsoft.com/office/drawing/2010/main">
+        <mc:Choice Requires="a14">
           <p:sp>
             <p:nvSpPr>
               <p:cNvPr id="15" name="Rectangle 14">
@@ -5792,6 +5797,7 @@
               </a:bodyPr>
               <a:lstStyle/>
               <a:p>
+                <a:pPr/>
                 <a14:m>
                   <m:oMathPara xmlns:m="http://schemas.openxmlformats.org/officeDocument/2006/math">
                     <m:oMathParaPr>
@@ -5943,7 +5949,7 @@
             </p:txBody>
           </p:sp>
         </mc:Choice>
-        <mc:Fallback>
+        <mc:Fallback xmlns="">
           <p:sp>
             <p:nvSpPr>
               <p:cNvPr id="15" name="Rectangle 14">

</xml_diff>